<commit_message>
Finished the stop signal game
</commit_message>
<xml_diff>
--- a/stopsignalGame/StopSignalGameImages.pptx
+++ b/stopsignalGame/StopSignalGameImages.pptx
@@ -2071,10 +2071,10 @@
       </p:grpSpPr>
       <p:sp>
         <p:nvSpPr>
-          <p:cNvPr id="2" name="TextBox 1">
+          <p:cNvPr id="3" name="TextBox 2">
             <a:extLst>
               <a:ext uri="{FF2B5EF4-FFF2-40B4-BE49-F238E27FC236}">
-                <a16:creationId xmlns:a16="http://schemas.microsoft.com/office/drawing/2014/main" id="{FA4C07EE-4450-E8D8-AC96-D3AB109709C2}"/>
+                <a16:creationId xmlns:a16="http://schemas.microsoft.com/office/drawing/2014/main" id="{5C469FB7-C60C-248E-A62B-8B494AF60626}"/>
               </a:ext>
             </a:extLst>
           </p:cNvPr>
@@ -2083,8 +2083,8 @@
         </p:nvSpPr>
         <p:spPr>
           <a:xfrm>
-            <a:off x="4248347" y="3244334"/>
-            <a:ext cx="3695307" cy="369332"/>
+            <a:off x="646761" y="286140"/>
+            <a:ext cx="10898477" cy="6268639"/>
           </a:xfrm>
           <a:prstGeom prst="rect">
             <a:avLst/>
@@ -2092,16 +2092,104 @@
           <a:noFill/>
         </p:spPr>
         <p:txBody>
-          <a:bodyPr wrap="none" rtlCol="0">
+          <a:bodyPr wrap="square" rtlCol="0">
             <a:spAutoFit/>
           </a:bodyPr>
           <a:lstStyle/>
           <a:p>
+            <a:pPr algn="ctr"/>
             <a:r>
-              <a:rPr lang="en-GB" dirty="0"/>
-              <a:t>Instructions for how to play the game</a:t>
+              <a:rPr lang="en-GB" sz="4000" b="1" dirty="0"/>
+              <a:t>Rules of the game</a:t>
             </a:r>
-            <a:endParaRPr lang="en-DK" dirty="0"/>
+          </a:p>
+          <a:p>
+            <a:pPr marL="285750" indent="-285750">
+              <a:lnSpc>
+                <a:spcPct val="110000"/>
+              </a:lnSpc>
+              <a:buFont typeface="Arial" panose="020B0604020202020204" pitchFamily="34" charset="0"/>
+              <a:buChar char="•"/>
+            </a:pPr>
+            <a:r>
+              <a:rPr lang="en-GB" sz="3000" dirty="0"/>
+              <a:t>The objective of the game is to get as many points as possible.</a:t>
+            </a:r>
+          </a:p>
+          <a:p>
+            <a:pPr marL="285750" indent="-285750">
+              <a:lnSpc>
+                <a:spcPct val="110000"/>
+              </a:lnSpc>
+              <a:buFont typeface="Arial" panose="020B0604020202020204" pitchFamily="34" charset="0"/>
+              <a:buChar char="•"/>
+            </a:pPr>
+            <a:r>
+              <a:rPr lang="en-GB" sz="3000" dirty="0"/>
+              <a:t>In GO trials you get points if you answer correct. How many points you get depends on your LEVEL.</a:t>
+            </a:r>
+          </a:p>
+          <a:p>
+            <a:pPr marL="285750" indent="-285750">
+              <a:lnSpc>
+                <a:spcPct val="110000"/>
+              </a:lnSpc>
+              <a:buFont typeface="Arial" panose="020B0604020202020204" pitchFamily="34" charset="0"/>
+              <a:buChar char="•"/>
+            </a:pPr>
+            <a:r>
+              <a:rPr lang="en-GB" sz="3000" dirty="0"/>
+              <a:t>In GO trials the faster you answer correctly the more your LEVEL increases.</a:t>
+            </a:r>
+          </a:p>
+          <a:p>
+            <a:pPr marL="285750" indent="-285750">
+              <a:lnSpc>
+                <a:spcPct val="110000"/>
+              </a:lnSpc>
+              <a:buFont typeface="Arial" panose="020B0604020202020204" pitchFamily="34" charset="0"/>
+              <a:buChar char="•"/>
+            </a:pPr>
+            <a:r>
+              <a:rPr lang="en-GB" sz="3000" dirty="0"/>
+              <a:t>In GO trials if you answer incorrectly, you get no points and no LEVEL increase.</a:t>
+            </a:r>
+          </a:p>
+          <a:p>
+            <a:pPr marL="285750" indent="-285750">
+              <a:lnSpc>
+                <a:spcPct val="110000"/>
+              </a:lnSpc>
+              <a:buFont typeface="Arial" panose="020B0604020202020204" pitchFamily="34" charset="0"/>
+              <a:buChar char="•"/>
+            </a:pPr>
+            <a:r>
+              <a:rPr lang="en-GB" sz="3000" dirty="0"/>
+              <a:t>In STOP trials if you answer incorrectly your LEVEL is reset back to start.</a:t>
+            </a:r>
+          </a:p>
+          <a:p>
+            <a:pPr marL="285750" indent="-285750">
+              <a:lnSpc>
+                <a:spcPct val="110000"/>
+              </a:lnSpc>
+              <a:buFont typeface="Arial" panose="020B0604020202020204" pitchFamily="34" charset="0"/>
+              <a:buChar char="•"/>
+            </a:pPr>
+            <a:r>
+              <a:rPr lang="en-GB" sz="3000" dirty="0"/>
+              <a:t>Increasing your LEVEL is very important for getting a lot of points.</a:t>
+            </a:r>
+          </a:p>
+          <a:p>
+            <a:pPr marL="285750" indent="-285750">
+              <a:lnSpc>
+                <a:spcPct val="110000"/>
+              </a:lnSpc>
+              <a:buFont typeface="Arial" panose="020B0604020202020204" pitchFamily="34" charset="0"/>
+              <a:buChar char="•"/>
+            </a:pPr>
+            <a:endParaRPr lang="en-GB" sz="3000" dirty="0"/>
           </a:p>
         </p:txBody>
       </p:sp>

</xml_diff>

<commit_message>
Updated the stop signal game
</commit_message>
<xml_diff>
--- a/stopsignalGame/StopSignalGameImages.pptx
+++ b/stopsignalGame/StopSignalGameImages.pptx
@@ -5,19 +5,17 @@
     <p:sldMasterId id="2147483648" r:id="rId1"/>
   </p:sldMasterIdLst>
   <p:notesMasterIdLst>
-    <p:notesMasterId r:id="rId12"/>
+    <p:notesMasterId r:id="rId10"/>
   </p:notesMasterIdLst>
   <p:sldIdLst>
     <p:sldId id="256" r:id="rId2"/>
     <p:sldId id="257" r:id="rId3"/>
     <p:sldId id="258" r:id="rId4"/>
     <p:sldId id="259" r:id="rId5"/>
-    <p:sldId id="260" r:id="rId6"/>
-    <p:sldId id="261" r:id="rId7"/>
-    <p:sldId id="265" r:id="rId8"/>
-    <p:sldId id="263" r:id="rId9"/>
-    <p:sldId id="264" r:id="rId10"/>
-    <p:sldId id="266" r:id="rId11"/>
+    <p:sldId id="263" r:id="rId6"/>
+    <p:sldId id="264" r:id="rId7"/>
+    <p:sldId id="266" r:id="rId8"/>
+    <p:sldId id="265" r:id="rId9"/>
   </p:sldIdLst>
   <p:sldSz cx="12192000" cy="6858000"/>
   <p:notesSz cx="6858000" cy="9144000"/>
@@ -206,7 +204,7 @@
           <a:p>
             <a:fld id="{85D405C8-8E2E-43B7-A24E-734C11CAF91E}" type="datetimeFigureOut">
               <a:rPr lang="en-DK" smtClean="0"/>
-              <a:t>08/11/2024</a:t>
+              <a:t>02/01/2025</a:t>
             </a:fld>
             <a:endParaRPr lang="en-DK"/>
           </a:p>
@@ -584,94 +582,6 @@
 </p:notes>
 </file>
 
-<file path=ppt/notesSlides/notesSlide10.xml><?xml version="1.0" encoding="utf-8"?>
-<p:notes xmlns:a="http://schemas.openxmlformats.org/drawingml/2006/main" xmlns:r="http://schemas.openxmlformats.org/officeDocument/2006/relationships" xmlns:p="http://schemas.openxmlformats.org/presentationml/2006/main">
-  <p:cSld>
-    <p:spTree>
-      <p:nvGrpSpPr>
-        <p:cNvPr id="1" name=""/>
-        <p:cNvGrpSpPr/>
-        <p:nvPr/>
-      </p:nvGrpSpPr>
-      <p:grpSpPr>
-        <a:xfrm>
-          <a:off x="0" y="0"/>
-          <a:ext cx="0" cy="0"/>
-          <a:chOff x="0" y="0"/>
-          <a:chExt cx="0" cy="0"/>
-        </a:xfrm>
-      </p:grpSpPr>
-      <p:sp>
-        <p:nvSpPr>
-          <p:cNvPr id="2" name="Slide Image Placeholder 1"/>
-          <p:cNvSpPr>
-            <a:spLocks noGrp="1" noRot="1" noChangeAspect="1"/>
-          </p:cNvSpPr>
-          <p:nvPr>
-            <p:ph type="sldImg"/>
-          </p:nvPr>
-        </p:nvSpPr>
-        <p:spPr/>
-      </p:sp>
-      <p:sp>
-        <p:nvSpPr>
-          <p:cNvPr id="3" name="Notes Placeholder 2"/>
-          <p:cNvSpPr>
-            <a:spLocks noGrp="1"/>
-          </p:cNvSpPr>
-          <p:nvPr>
-            <p:ph type="body" idx="1"/>
-          </p:nvPr>
-        </p:nvSpPr>
-        <p:spPr/>
-        <p:txBody>
-          <a:bodyPr/>
-          <a:lstStyle/>
-          <a:p>
-            <a:r>
-              <a:rPr lang="en-GB" dirty="0"/>
-              <a:t>GameInstructions.png</a:t>
-            </a:r>
-            <a:endParaRPr lang="en-DK" dirty="0"/>
-          </a:p>
-        </p:txBody>
-      </p:sp>
-      <p:sp>
-        <p:nvSpPr>
-          <p:cNvPr id="4" name="Slide Number Placeholder 3"/>
-          <p:cNvSpPr>
-            <a:spLocks noGrp="1"/>
-          </p:cNvSpPr>
-          <p:nvPr>
-            <p:ph type="sldNum" sz="quarter" idx="5"/>
-          </p:nvPr>
-        </p:nvSpPr>
-        <p:spPr/>
-        <p:txBody>
-          <a:bodyPr/>
-          <a:lstStyle/>
-          <a:p>
-            <a:fld id="{18F6FCD6-91F5-47FE-A090-45B8ABDB6EF6}" type="slidenum">
-              <a:rPr lang="en-DK" smtClean="0"/>
-              <a:t>10</a:t>
-            </a:fld>
-            <a:endParaRPr lang="en-DK"/>
-          </a:p>
-        </p:txBody>
-      </p:sp>
-    </p:spTree>
-    <p:extLst>
-      <p:ext uri="{BB962C8B-B14F-4D97-AF65-F5344CB8AC3E}">
-        <p14:creationId xmlns:p14="http://schemas.microsoft.com/office/powerpoint/2010/main" val="2936752502"/>
-      </p:ext>
-    </p:extLst>
-  </p:cSld>
-  <p:clrMapOvr>
-    <a:masterClrMapping/>
-  </p:clrMapOvr>
-</p:notes>
-</file>
-
 <file path=ppt/notesSlides/notesSlide2.xml><?xml version="1.0" encoding="utf-8"?>
 <p:notes xmlns:a="http://schemas.openxmlformats.org/drawingml/2006/main" xmlns:r="http://schemas.openxmlformats.org/officeDocument/2006/relationships" xmlns:p="http://schemas.openxmlformats.org/presentationml/2006/main">
   <p:cSld>
@@ -1071,7 +981,7 @@
                 <a:effectLst/>
                 <a:latin typeface="Fira Code" pitchFamily="1" charset="0"/>
               </a:rPr>
-              <a:t>Correct.png</a:t>
+              <a:t>Clear.png</a:t>
             </a:r>
           </a:p>
         </p:txBody>
@@ -1102,7 +1012,7 @@
     </p:spTree>
     <p:extLst>
       <p:ext uri="{BB962C8B-B14F-4D97-AF65-F5344CB8AC3E}">
-        <p14:creationId xmlns:p14="http://schemas.microsoft.com/office/powerpoint/2010/main" val="4132265323"/>
+        <p14:creationId xmlns:p14="http://schemas.microsoft.com/office/powerpoint/2010/main" val="2497363235"/>
       </p:ext>
     </p:extLst>
   </p:cSld>
@@ -1181,7 +1091,7 @@
                 <a:effectLst/>
                 <a:latin typeface="Fira Code" pitchFamily="1" charset="0"/>
               </a:rPr>
-              <a:t>Wrong.png</a:t>
+              <a:t>FixationCross.png</a:t>
             </a:r>
           </a:p>
         </p:txBody>
@@ -1212,7 +1122,7 @@
     </p:spTree>
     <p:extLst>
       <p:ext uri="{BB962C8B-B14F-4D97-AF65-F5344CB8AC3E}">
-        <p14:creationId xmlns:p14="http://schemas.microsoft.com/office/powerpoint/2010/main" val="1025108791"/>
+        <p14:creationId xmlns:p14="http://schemas.microsoft.com/office/powerpoint/2010/main" val="433263950"/>
       </p:ext>
     </p:extLst>
   </p:cSld>
@@ -1223,6 +1133,94 @@
 </file>
 
 <file path=ppt/notesSlides/notesSlide7.xml><?xml version="1.0" encoding="utf-8"?>
+<p:notes xmlns:a="http://schemas.openxmlformats.org/drawingml/2006/main" xmlns:r="http://schemas.openxmlformats.org/officeDocument/2006/relationships" xmlns:p="http://schemas.openxmlformats.org/presentationml/2006/main">
+  <p:cSld>
+    <p:spTree>
+      <p:nvGrpSpPr>
+        <p:cNvPr id="1" name=""/>
+        <p:cNvGrpSpPr/>
+        <p:nvPr/>
+      </p:nvGrpSpPr>
+      <p:grpSpPr>
+        <a:xfrm>
+          <a:off x="0" y="0"/>
+          <a:ext cx="0" cy="0"/>
+          <a:chOff x="0" y="0"/>
+          <a:chExt cx="0" cy="0"/>
+        </a:xfrm>
+      </p:grpSpPr>
+      <p:sp>
+        <p:nvSpPr>
+          <p:cNvPr id="2" name="Slide Image Placeholder 1"/>
+          <p:cNvSpPr>
+            <a:spLocks noGrp="1" noRot="1" noChangeAspect="1"/>
+          </p:cNvSpPr>
+          <p:nvPr>
+            <p:ph type="sldImg"/>
+          </p:nvPr>
+        </p:nvSpPr>
+        <p:spPr/>
+      </p:sp>
+      <p:sp>
+        <p:nvSpPr>
+          <p:cNvPr id="3" name="Notes Placeholder 2"/>
+          <p:cNvSpPr>
+            <a:spLocks noGrp="1"/>
+          </p:cNvSpPr>
+          <p:nvPr>
+            <p:ph type="body" idx="1"/>
+          </p:nvPr>
+        </p:nvSpPr>
+        <p:spPr/>
+        <p:txBody>
+          <a:bodyPr/>
+          <a:lstStyle/>
+          <a:p>
+            <a:r>
+              <a:rPr lang="en-GB" dirty="0"/>
+              <a:t>GameInstructions.png</a:t>
+            </a:r>
+            <a:endParaRPr lang="en-DK" dirty="0"/>
+          </a:p>
+        </p:txBody>
+      </p:sp>
+      <p:sp>
+        <p:nvSpPr>
+          <p:cNvPr id="4" name="Slide Number Placeholder 3"/>
+          <p:cNvSpPr>
+            <a:spLocks noGrp="1"/>
+          </p:cNvSpPr>
+          <p:nvPr>
+            <p:ph type="sldNum" sz="quarter" idx="5"/>
+          </p:nvPr>
+        </p:nvSpPr>
+        <p:spPr/>
+        <p:txBody>
+          <a:bodyPr/>
+          <a:lstStyle/>
+          <a:p>
+            <a:fld id="{18F6FCD6-91F5-47FE-A090-45B8ABDB6EF6}" type="slidenum">
+              <a:rPr lang="en-DK" smtClean="0"/>
+              <a:t>7</a:t>
+            </a:fld>
+            <a:endParaRPr lang="en-DK"/>
+          </a:p>
+        </p:txBody>
+      </p:sp>
+    </p:spTree>
+    <p:extLst>
+      <p:ext uri="{BB962C8B-B14F-4D97-AF65-F5344CB8AC3E}">
+        <p14:creationId xmlns:p14="http://schemas.microsoft.com/office/powerpoint/2010/main" val="2936752502"/>
+      </p:ext>
+    </p:extLst>
+  </p:cSld>
+  <p:clrMapOvr>
+    <a:masterClrMapping/>
+  </p:clrMapOvr>
+</p:notes>
+</file>
+
+<file path=ppt/notesSlides/notesSlide8.xml><?xml version="1.0" encoding="utf-8"?>
 <p:notes xmlns:a="http://schemas.openxmlformats.org/drawingml/2006/main" xmlns:r="http://schemas.openxmlformats.org/officeDocument/2006/relationships" xmlns:p="http://schemas.openxmlformats.org/presentationml/2006/main">
   <p:cSld>
     <p:spTree>
@@ -1311,117 +1309,7 @@
           <a:bodyPr/>
           <a:lstStyle/>
           <a:p>
-            <a:fld id="{18F6FCD6-91F5-47FE-A090-45B8ABDB6EF6}" type="slidenum">
-              <a:rPr lang="en-DK" smtClean="0"/>
-              <a:t>7</a:t>
-            </a:fld>
-            <a:endParaRPr lang="en-DK"/>
-          </a:p>
-        </p:txBody>
-      </p:sp>
-    </p:spTree>
-    <p:extLst>
-      <p:ext uri="{BB962C8B-B14F-4D97-AF65-F5344CB8AC3E}">
-        <p14:creationId xmlns:p14="http://schemas.microsoft.com/office/powerpoint/2010/main" val="142095248"/>
-      </p:ext>
-    </p:extLst>
-  </p:cSld>
-  <p:clrMapOvr>
-    <a:masterClrMapping/>
-  </p:clrMapOvr>
-</p:notes>
-</file>
-
-<file path=ppt/notesSlides/notesSlide8.xml><?xml version="1.0" encoding="utf-8"?>
-<p:notes xmlns:a="http://schemas.openxmlformats.org/drawingml/2006/main" xmlns:r="http://schemas.openxmlformats.org/officeDocument/2006/relationships" xmlns:p="http://schemas.openxmlformats.org/presentationml/2006/main">
-  <p:cSld>
-    <p:spTree>
-      <p:nvGrpSpPr>
-        <p:cNvPr id="1" name=""/>
-        <p:cNvGrpSpPr/>
-        <p:nvPr/>
-      </p:nvGrpSpPr>
-      <p:grpSpPr>
-        <a:xfrm>
-          <a:off x="0" y="0"/>
-          <a:ext cx="0" cy="0"/>
-          <a:chOff x="0" y="0"/>
-          <a:chExt cx="0" cy="0"/>
-        </a:xfrm>
-      </p:grpSpPr>
-      <p:sp>
-        <p:nvSpPr>
-          <p:cNvPr id="2" name="Slide Image Placeholder 1"/>
-          <p:cNvSpPr>
-            <a:spLocks noGrp="1" noRot="1" noChangeAspect="1"/>
-          </p:cNvSpPr>
-          <p:nvPr>
-            <p:ph type="sldImg"/>
-          </p:nvPr>
-        </p:nvSpPr>
-        <p:spPr/>
-      </p:sp>
-      <p:sp>
-        <p:nvSpPr>
-          <p:cNvPr id="3" name="Notes Placeholder 2"/>
-          <p:cNvSpPr>
-            <a:spLocks noGrp="1"/>
-          </p:cNvSpPr>
-          <p:nvPr>
-            <p:ph type="body" idx="1"/>
-          </p:nvPr>
-        </p:nvSpPr>
-        <p:spPr/>
-        <p:txBody>
-          <a:bodyPr/>
-          <a:lstStyle/>
-          <a:p>
-            <a:pPr marL="0" marR="0" lvl="0" indent="0" algn="l" defTabSz="914400" rtl="0" eaLnBrk="1" fontAlgn="auto" latinLnBrk="0" hangingPunct="1">
-              <a:lnSpc>
-                <a:spcPct val="100000"/>
-              </a:lnSpc>
-              <a:spcBef>
-                <a:spcPts val="0"/>
-              </a:spcBef>
-              <a:spcAft>
-                <a:spcPts val="0"/>
-              </a:spcAft>
-              <a:buClrTx/>
-              <a:buSzTx/>
-              <a:buFontTx/>
-              <a:buNone/>
-              <a:tabLst/>
-              <a:defRPr/>
-            </a:pPr>
-            <a:r>
-              <a:rPr lang="en-GB" b="0" dirty="0">
-                <a:solidFill>
-                  <a:srgbClr val="D4D4D4"/>
-                </a:solidFill>
-                <a:effectLst/>
-                <a:latin typeface="Fira Code" pitchFamily="1" charset="0"/>
-              </a:rPr>
-              <a:t>Clear.png</a:t>
-            </a:r>
-          </a:p>
-        </p:txBody>
-      </p:sp>
-      <p:sp>
-        <p:nvSpPr>
-          <p:cNvPr id="4" name="Slide Number Placeholder 3"/>
-          <p:cNvSpPr>
-            <a:spLocks noGrp="1"/>
-          </p:cNvSpPr>
-          <p:nvPr>
-            <p:ph type="sldNum" sz="quarter" idx="5"/>
-          </p:nvPr>
-        </p:nvSpPr>
-        <p:spPr/>
-        <p:txBody>
-          <a:bodyPr/>
-          <a:lstStyle/>
-          <a:p>
-            <a:fld id="{18F6FCD6-91F5-47FE-A090-45B8ABDB6EF6}" type="slidenum">
+            <a:fld id="{FFC4B7A3-226D-44E8-84CB-03CFFB6589DC}" type="slidenum">
               <a:rPr lang="en-DK" smtClean="0"/>
               <a:t>8</a:t>
             </a:fld>
@@ -1432,117 +1320,7 @@
     </p:spTree>
     <p:extLst>
       <p:ext uri="{BB962C8B-B14F-4D97-AF65-F5344CB8AC3E}">
-        <p14:creationId xmlns:p14="http://schemas.microsoft.com/office/powerpoint/2010/main" val="2497363235"/>
-      </p:ext>
-    </p:extLst>
-  </p:cSld>
-  <p:clrMapOvr>
-    <a:masterClrMapping/>
-  </p:clrMapOvr>
-</p:notes>
-</file>
-
-<file path=ppt/notesSlides/notesSlide9.xml><?xml version="1.0" encoding="utf-8"?>
-<p:notes xmlns:a="http://schemas.openxmlformats.org/drawingml/2006/main" xmlns:r="http://schemas.openxmlformats.org/officeDocument/2006/relationships" xmlns:p="http://schemas.openxmlformats.org/presentationml/2006/main">
-  <p:cSld>
-    <p:spTree>
-      <p:nvGrpSpPr>
-        <p:cNvPr id="1" name=""/>
-        <p:cNvGrpSpPr/>
-        <p:nvPr/>
-      </p:nvGrpSpPr>
-      <p:grpSpPr>
-        <a:xfrm>
-          <a:off x="0" y="0"/>
-          <a:ext cx="0" cy="0"/>
-          <a:chOff x="0" y="0"/>
-          <a:chExt cx="0" cy="0"/>
-        </a:xfrm>
-      </p:grpSpPr>
-      <p:sp>
-        <p:nvSpPr>
-          <p:cNvPr id="2" name="Slide Image Placeholder 1"/>
-          <p:cNvSpPr>
-            <a:spLocks noGrp="1" noRot="1" noChangeAspect="1"/>
-          </p:cNvSpPr>
-          <p:nvPr>
-            <p:ph type="sldImg"/>
-          </p:nvPr>
-        </p:nvSpPr>
-        <p:spPr/>
-      </p:sp>
-      <p:sp>
-        <p:nvSpPr>
-          <p:cNvPr id="3" name="Notes Placeholder 2"/>
-          <p:cNvSpPr>
-            <a:spLocks noGrp="1"/>
-          </p:cNvSpPr>
-          <p:nvPr>
-            <p:ph type="body" idx="1"/>
-          </p:nvPr>
-        </p:nvSpPr>
-        <p:spPr/>
-        <p:txBody>
-          <a:bodyPr/>
-          <a:lstStyle/>
-          <a:p>
-            <a:pPr marL="0" marR="0" lvl="0" indent="0" algn="l" defTabSz="914400" rtl="0" eaLnBrk="1" fontAlgn="auto" latinLnBrk="0" hangingPunct="1">
-              <a:lnSpc>
-                <a:spcPct val="100000"/>
-              </a:lnSpc>
-              <a:spcBef>
-                <a:spcPts val="0"/>
-              </a:spcBef>
-              <a:spcAft>
-                <a:spcPts val="0"/>
-              </a:spcAft>
-              <a:buClrTx/>
-              <a:buSzTx/>
-              <a:buFontTx/>
-              <a:buNone/>
-              <a:tabLst/>
-              <a:defRPr/>
-            </a:pPr>
-            <a:r>
-              <a:rPr lang="en-GB" b="0" dirty="0">
-                <a:solidFill>
-                  <a:srgbClr val="D4D4D4"/>
-                </a:solidFill>
-                <a:effectLst/>
-                <a:latin typeface="Fira Code" pitchFamily="1" charset="0"/>
-              </a:rPr>
-              <a:t>FixationCross.png</a:t>
-            </a:r>
-          </a:p>
-        </p:txBody>
-      </p:sp>
-      <p:sp>
-        <p:nvSpPr>
-          <p:cNvPr id="4" name="Slide Number Placeholder 3"/>
-          <p:cNvSpPr>
-            <a:spLocks noGrp="1"/>
-          </p:cNvSpPr>
-          <p:nvPr>
-            <p:ph type="sldNum" sz="quarter" idx="5"/>
-          </p:nvPr>
-        </p:nvSpPr>
-        <p:spPr/>
-        <p:txBody>
-          <a:bodyPr/>
-          <a:lstStyle/>
-          <a:p>
-            <a:fld id="{18F6FCD6-91F5-47FE-A090-45B8ABDB6EF6}" type="slidenum">
-              <a:rPr lang="en-DK" smtClean="0"/>
-              <a:t>9</a:t>
-            </a:fld>
-            <a:endParaRPr lang="en-DK"/>
-          </a:p>
-        </p:txBody>
-      </p:sp>
-    </p:spTree>
-    <p:extLst>
-      <p:ext uri="{BB962C8B-B14F-4D97-AF65-F5344CB8AC3E}">
-        <p14:creationId xmlns:p14="http://schemas.microsoft.com/office/powerpoint/2010/main" val="433263950"/>
+        <p14:creationId xmlns:p14="http://schemas.microsoft.com/office/powerpoint/2010/main" val="985749501"/>
       </p:ext>
     </p:extLst>
   </p:cSld>
@@ -2052,160 +1830,6 @@
 </p:sld>
 </file>
 
-<file path=ppt/slides/slide10.xml><?xml version="1.0" encoding="utf-8"?>
-<p:sld xmlns:a="http://schemas.openxmlformats.org/drawingml/2006/main" xmlns:r="http://schemas.openxmlformats.org/officeDocument/2006/relationships" xmlns:p="http://schemas.openxmlformats.org/presentationml/2006/main">
-  <p:cSld>
-    <p:spTree>
-      <p:nvGrpSpPr>
-        <p:cNvPr id="1" name=""/>
-        <p:cNvGrpSpPr/>
-        <p:nvPr/>
-      </p:nvGrpSpPr>
-      <p:grpSpPr>
-        <a:xfrm>
-          <a:off x="0" y="0"/>
-          <a:ext cx="0" cy="0"/>
-          <a:chOff x="0" y="0"/>
-          <a:chExt cx="0" cy="0"/>
-        </a:xfrm>
-      </p:grpSpPr>
-      <p:sp>
-        <p:nvSpPr>
-          <p:cNvPr id="3" name="TextBox 2">
-            <a:extLst>
-              <a:ext uri="{FF2B5EF4-FFF2-40B4-BE49-F238E27FC236}">
-                <a16:creationId xmlns:a16="http://schemas.microsoft.com/office/drawing/2014/main" id="{5C469FB7-C60C-248E-A62B-8B494AF60626}"/>
-              </a:ext>
-            </a:extLst>
-          </p:cNvPr>
-          <p:cNvSpPr txBox="1"/>
-          <p:nvPr/>
-        </p:nvSpPr>
-        <p:spPr>
-          <a:xfrm>
-            <a:off x="646761" y="286140"/>
-            <a:ext cx="10898477" cy="6268639"/>
-          </a:xfrm>
-          <a:prstGeom prst="rect">
-            <a:avLst/>
-          </a:prstGeom>
-          <a:noFill/>
-        </p:spPr>
-        <p:txBody>
-          <a:bodyPr wrap="square" rtlCol="0">
-            <a:spAutoFit/>
-          </a:bodyPr>
-          <a:lstStyle/>
-          <a:p>
-            <a:pPr algn="ctr"/>
-            <a:r>
-              <a:rPr lang="en-GB" sz="4000" b="1" dirty="0"/>
-              <a:t>Rules of the game</a:t>
-            </a:r>
-          </a:p>
-          <a:p>
-            <a:pPr marL="285750" indent="-285750">
-              <a:lnSpc>
-                <a:spcPct val="110000"/>
-              </a:lnSpc>
-              <a:buFont typeface="Arial" panose="020B0604020202020204" pitchFamily="34" charset="0"/>
-              <a:buChar char="•"/>
-            </a:pPr>
-            <a:r>
-              <a:rPr lang="en-GB" sz="3000" dirty="0"/>
-              <a:t>The objective of the game is to get as many points as possible.</a:t>
-            </a:r>
-          </a:p>
-          <a:p>
-            <a:pPr marL="285750" indent="-285750">
-              <a:lnSpc>
-                <a:spcPct val="110000"/>
-              </a:lnSpc>
-              <a:buFont typeface="Arial" panose="020B0604020202020204" pitchFamily="34" charset="0"/>
-              <a:buChar char="•"/>
-            </a:pPr>
-            <a:r>
-              <a:rPr lang="en-GB" sz="3000" dirty="0"/>
-              <a:t>In GO trials you get points if you answer correct. How many points you get depends on your LEVEL.</a:t>
-            </a:r>
-          </a:p>
-          <a:p>
-            <a:pPr marL="285750" indent="-285750">
-              <a:lnSpc>
-                <a:spcPct val="110000"/>
-              </a:lnSpc>
-              <a:buFont typeface="Arial" panose="020B0604020202020204" pitchFamily="34" charset="0"/>
-              <a:buChar char="•"/>
-            </a:pPr>
-            <a:r>
-              <a:rPr lang="en-GB" sz="3000" dirty="0"/>
-              <a:t>In GO trials the faster you answer correctly the more your LEVEL increases.</a:t>
-            </a:r>
-          </a:p>
-          <a:p>
-            <a:pPr marL="285750" indent="-285750">
-              <a:lnSpc>
-                <a:spcPct val="110000"/>
-              </a:lnSpc>
-              <a:buFont typeface="Arial" panose="020B0604020202020204" pitchFamily="34" charset="0"/>
-              <a:buChar char="•"/>
-            </a:pPr>
-            <a:r>
-              <a:rPr lang="en-GB" sz="3000" dirty="0"/>
-              <a:t>In GO trials if you answer incorrectly, you get no points and no LEVEL increase.</a:t>
-            </a:r>
-          </a:p>
-          <a:p>
-            <a:pPr marL="285750" indent="-285750">
-              <a:lnSpc>
-                <a:spcPct val="110000"/>
-              </a:lnSpc>
-              <a:buFont typeface="Arial" panose="020B0604020202020204" pitchFamily="34" charset="0"/>
-              <a:buChar char="•"/>
-            </a:pPr>
-            <a:r>
-              <a:rPr lang="en-GB" sz="3000" dirty="0"/>
-              <a:t>In STOP trials if you answer incorrectly your LEVEL is reset back to start.</a:t>
-            </a:r>
-          </a:p>
-          <a:p>
-            <a:pPr marL="285750" indent="-285750">
-              <a:lnSpc>
-                <a:spcPct val="110000"/>
-              </a:lnSpc>
-              <a:buFont typeface="Arial" panose="020B0604020202020204" pitchFamily="34" charset="0"/>
-              <a:buChar char="•"/>
-            </a:pPr>
-            <a:r>
-              <a:rPr lang="en-GB" sz="3000" dirty="0"/>
-              <a:t>Increasing your LEVEL is very important for getting a lot of points.</a:t>
-            </a:r>
-          </a:p>
-          <a:p>
-            <a:pPr marL="285750" indent="-285750">
-              <a:lnSpc>
-                <a:spcPct val="110000"/>
-              </a:lnSpc>
-              <a:buFont typeface="Arial" panose="020B0604020202020204" pitchFamily="34" charset="0"/>
-              <a:buChar char="•"/>
-            </a:pPr>
-            <a:endParaRPr lang="en-GB" sz="3000" dirty="0"/>
-          </a:p>
-        </p:txBody>
-      </p:sp>
-    </p:spTree>
-    <p:extLst>
-      <p:ext uri="{BB962C8B-B14F-4D97-AF65-F5344CB8AC3E}">
-        <p14:creationId xmlns:p14="http://schemas.microsoft.com/office/powerpoint/2010/main" val="3266365140"/>
-      </p:ext>
-    </p:extLst>
-  </p:cSld>
-  <p:clrMapOvr>
-    <a:masterClrMapping/>
-  </p:clrMapOvr>
-</p:sld>
-</file>
-
 <file path=ppt/slides/slide2.xml><?xml version="1.0" encoding="utf-8"?>
 <p:sld xmlns:a="http://schemas.openxmlformats.org/drawingml/2006/main" xmlns:r="http://schemas.openxmlformats.org/officeDocument/2006/relationships" xmlns:p="http://schemas.openxmlformats.org/presentationml/2006/main">
   <p:cSld>
@@ -2528,272 +2152,6 @@
           <a:chExt cx="0" cy="0"/>
         </a:xfrm>
       </p:grpSpPr>
-      <p:sp>
-        <p:nvSpPr>
-          <p:cNvPr id="2" name="TextBox 1">
-            <a:extLst>
-              <a:ext uri="{FF2B5EF4-FFF2-40B4-BE49-F238E27FC236}">
-                <a16:creationId xmlns:a16="http://schemas.microsoft.com/office/drawing/2014/main" id="{39D9F032-BA88-C233-03A9-217FFC9335E9}"/>
-              </a:ext>
-            </a:extLst>
-          </p:cNvPr>
-          <p:cNvSpPr txBox="1"/>
-          <p:nvPr/>
-        </p:nvSpPr>
-        <p:spPr>
-          <a:xfrm>
-            <a:off x="2371903" y="2228671"/>
-            <a:ext cx="7448193" cy="2400657"/>
-          </a:xfrm>
-          <a:prstGeom prst="rect">
-            <a:avLst/>
-          </a:prstGeom>
-          <a:noFill/>
-        </p:spPr>
-        <p:txBody>
-          <a:bodyPr wrap="none" rtlCol="0">
-            <a:spAutoFit/>
-          </a:bodyPr>
-          <a:lstStyle/>
-          <a:p>
-            <a:r>
-              <a:rPr lang="en-GB" sz="15000" dirty="0">
-                <a:solidFill>
-                  <a:srgbClr val="92D050"/>
-                </a:solidFill>
-              </a:rPr>
-              <a:t>CORRECT</a:t>
-            </a:r>
-            <a:endParaRPr lang="en-DK" sz="15000" dirty="0">
-              <a:solidFill>
-                <a:srgbClr val="92D050"/>
-              </a:solidFill>
-            </a:endParaRPr>
-          </a:p>
-        </p:txBody>
-      </p:sp>
-    </p:spTree>
-    <p:extLst>
-      <p:ext uri="{BB962C8B-B14F-4D97-AF65-F5344CB8AC3E}">
-        <p14:creationId xmlns:p14="http://schemas.microsoft.com/office/powerpoint/2010/main" val="3433367663"/>
-      </p:ext>
-    </p:extLst>
-  </p:cSld>
-  <p:clrMapOvr>
-    <a:masterClrMapping/>
-  </p:clrMapOvr>
-</p:sld>
-</file>
-
-<file path=ppt/slides/slide6.xml><?xml version="1.0" encoding="utf-8"?>
-<p:sld xmlns:a="http://schemas.openxmlformats.org/drawingml/2006/main" xmlns:r="http://schemas.openxmlformats.org/officeDocument/2006/relationships" xmlns:p="http://schemas.openxmlformats.org/presentationml/2006/main">
-  <p:cSld>
-    <p:spTree>
-      <p:nvGrpSpPr>
-        <p:cNvPr id="1" name=""/>
-        <p:cNvGrpSpPr/>
-        <p:nvPr/>
-      </p:nvGrpSpPr>
-      <p:grpSpPr>
-        <a:xfrm>
-          <a:off x="0" y="0"/>
-          <a:ext cx="0" cy="0"/>
-          <a:chOff x="0" y="0"/>
-          <a:chExt cx="0" cy="0"/>
-        </a:xfrm>
-      </p:grpSpPr>
-      <p:sp>
-        <p:nvSpPr>
-          <p:cNvPr id="2" name="TextBox 1">
-            <a:extLst>
-              <a:ext uri="{FF2B5EF4-FFF2-40B4-BE49-F238E27FC236}">
-                <a16:creationId xmlns:a16="http://schemas.microsoft.com/office/drawing/2014/main" id="{39D9F032-BA88-C233-03A9-217FFC9335E9}"/>
-              </a:ext>
-            </a:extLst>
-          </p:cNvPr>
-          <p:cNvSpPr txBox="1"/>
-          <p:nvPr/>
-        </p:nvSpPr>
-        <p:spPr>
-          <a:xfrm>
-            <a:off x="2769384" y="2228671"/>
-            <a:ext cx="6653232" cy="2400657"/>
-          </a:xfrm>
-          <a:prstGeom prst="rect">
-            <a:avLst/>
-          </a:prstGeom>
-          <a:noFill/>
-        </p:spPr>
-        <p:txBody>
-          <a:bodyPr wrap="none" rtlCol="0">
-            <a:spAutoFit/>
-          </a:bodyPr>
-          <a:lstStyle/>
-          <a:p>
-            <a:r>
-              <a:rPr lang="en-GB" sz="15000" dirty="0">
-                <a:solidFill>
-                  <a:srgbClr val="FF0000"/>
-                </a:solidFill>
-              </a:rPr>
-              <a:t>WRONG</a:t>
-            </a:r>
-            <a:endParaRPr lang="en-DK" sz="15000" dirty="0">
-              <a:solidFill>
-                <a:srgbClr val="FF0000"/>
-              </a:solidFill>
-            </a:endParaRPr>
-          </a:p>
-        </p:txBody>
-      </p:sp>
-    </p:spTree>
-    <p:extLst>
-      <p:ext uri="{BB962C8B-B14F-4D97-AF65-F5344CB8AC3E}">
-        <p14:creationId xmlns:p14="http://schemas.microsoft.com/office/powerpoint/2010/main" val="3340757031"/>
-      </p:ext>
-    </p:extLst>
-  </p:cSld>
-  <p:clrMapOvr>
-    <a:masterClrMapping/>
-  </p:clrMapOvr>
-</p:sld>
-</file>
-
-<file path=ppt/slides/slide7.xml><?xml version="1.0" encoding="utf-8"?>
-<p:sld xmlns:a="http://schemas.openxmlformats.org/drawingml/2006/main" xmlns:r="http://schemas.openxmlformats.org/officeDocument/2006/relationships" xmlns:p="http://schemas.openxmlformats.org/presentationml/2006/main">
-  <p:cSld>
-    <p:spTree>
-      <p:nvGrpSpPr>
-        <p:cNvPr id="1" name=""/>
-        <p:cNvGrpSpPr/>
-        <p:nvPr/>
-      </p:nvGrpSpPr>
-      <p:grpSpPr>
-        <a:xfrm>
-          <a:off x="0" y="0"/>
-          <a:ext cx="0" cy="0"/>
-          <a:chOff x="0" y="0"/>
-          <a:chExt cx="0" cy="0"/>
-        </a:xfrm>
-      </p:grpSpPr>
-      <p:sp>
-        <p:nvSpPr>
-          <p:cNvPr id="2" name="TextBox 1">
-            <a:extLst>
-              <a:ext uri="{FF2B5EF4-FFF2-40B4-BE49-F238E27FC236}">
-                <a16:creationId xmlns:a16="http://schemas.microsoft.com/office/drawing/2014/main" id="{AF388601-D0F5-FFE8-CB40-EB018A70D49F}"/>
-              </a:ext>
-            </a:extLst>
-          </p:cNvPr>
-          <p:cNvSpPr txBox="1"/>
-          <p:nvPr/>
-        </p:nvSpPr>
-        <p:spPr>
-          <a:xfrm>
-            <a:off x="646761" y="286140"/>
-            <a:ext cx="10898477" cy="6268639"/>
-          </a:xfrm>
-          <a:prstGeom prst="rect">
-            <a:avLst/>
-          </a:prstGeom>
-          <a:noFill/>
-        </p:spPr>
-        <p:txBody>
-          <a:bodyPr wrap="square" rtlCol="0">
-            <a:spAutoFit/>
-          </a:bodyPr>
-          <a:lstStyle/>
-          <a:p>
-            <a:pPr algn="ctr"/>
-            <a:r>
-              <a:rPr lang="en-GB" sz="4000" b="1" dirty="0"/>
-              <a:t>Instructions</a:t>
-            </a:r>
-          </a:p>
-          <a:p>
-            <a:pPr marL="285750" indent="-285750">
-              <a:lnSpc>
-                <a:spcPct val="110000"/>
-              </a:lnSpc>
-              <a:buFont typeface="Arial" panose="020B0604020202020204" pitchFamily="34" charset="0"/>
-              <a:buChar char="•"/>
-            </a:pPr>
-            <a:r>
-              <a:rPr lang="en-GB" sz="3000" dirty="0"/>
-              <a:t>In this task, you must respond as quickly and accurately as possible to a left or right-pointing arrow. You respond by pressing the keys of your pad with your left and right index fingers, respectively. </a:t>
-            </a:r>
-          </a:p>
-          <a:p>
-            <a:pPr marL="285750" indent="-285750">
-              <a:lnSpc>
-                <a:spcPct val="110000"/>
-              </a:lnSpc>
-              <a:buFont typeface="Arial" panose="020B0604020202020204" pitchFamily="34" charset="0"/>
-              <a:buChar char="•"/>
-            </a:pPr>
-            <a:r>
-              <a:rPr lang="en-GB" sz="3000" dirty="0"/>
-              <a:t>You have only up to half a second to respond, which is very short, so you must be ready for the task, which requires your full attention.</a:t>
-            </a:r>
-          </a:p>
-          <a:p>
-            <a:pPr marL="285750" indent="-285750">
-              <a:lnSpc>
-                <a:spcPct val="110000"/>
-              </a:lnSpc>
-              <a:buFont typeface="Arial" panose="020B0604020202020204" pitchFamily="34" charset="0"/>
-              <a:buChar char="•"/>
-            </a:pPr>
-            <a:r>
-              <a:rPr lang="en-GB" sz="3000" dirty="0"/>
-              <a:t>However, if you see a RED CIRCLE, you should NOT RESPOND!</a:t>
-            </a:r>
-          </a:p>
-          <a:p>
-            <a:pPr marL="285750" indent="-285750">
-              <a:lnSpc>
-                <a:spcPct val="110000"/>
-              </a:lnSpc>
-              <a:buFont typeface="Arial" panose="020B0604020202020204" pitchFamily="34" charset="0"/>
-              <a:buChar char="•"/>
-            </a:pPr>
-            <a:r>
-              <a:rPr lang="en-GB" sz="3000" dirty="0"/>
-              <a:t>It seems easy, but it is actually very difficult. Additionally, the computer will adjust the task speed based on your performance during the task; this means that sometimes, it will be difficult for you not to respond. </a:t>
-            </a:r>
-          </a:p>
-        </p:txBody>
-      </p:sp>
-    </p:spTree>
-    <p:extLst>
-      <p:ext uri="{BB962C8B-B14F-4D97-AF65-F5344CB8AC3E}">
-        <p14:creationId xmlns:p14="http://schemas.microsoft.com/office/powerpoint/2010/main" val="3297780617"/>
-      </p:ext>
-    </p:extLst>
-  </p:cSld>
-  <p:clrMapOvr>
-    <a:masterClrMapping/>
-  </p:clrMapOvr>
-</p:sld>
-</file>
-
-<file path=ppt/slides/slide8.xml><?xml version="1.0" encoding="utf-8"?>
-<p:sld xmlns:a="http://schemas.openxmlformats.org/drawingml/2006/main" xmlns:r="http://schemas.openxmlformats.org/officeDocument/2006/relationships" xmlns:p="http://schemas.openxmlformats.org/presentationml/2006/main">
-  <p:cSld>
-    <p:spTree>
-      <p:nvGrpSpPr>
-        <p:cNvPr id="1" name=""/>
-        <p:cNvGrpSpPr/>
-        <p:nvPr/>
-      </p:nvGrpSpPr>
-      <p:grpSpPr>
-        <a:xfrm>
-          <a:off x="0" y="0"/>
-          <a:ext cx="0" cy="0"/>
-          <a:chOff x="0" y="0"/>
-          <a:chExt cx="0" cy="0"/>
-        </a:xfrm>
-      </p:grpSpPr>
     </p:spTree>
     <p:extLst>
       <p:ext uri="{BB962C8B-B14F-4D97-AF65-F5344CB8AC3E}">
@@ -2807,7 +2165,7 @@
 </p:sld>
 </file>
 
-<file path=ppt/slides/slide9.xml><?xml version="1.0" encoding="utf-8"?>
+<file path=ppt/slides/slide6.xml><?xml version="1.0" encoding="utf-8"?>
 <p:sld xmlns:a="http://schemas.openxmlformats.org/drawingml/2006/main" xmlns:r="http://schemas.openxmlformats.org/officeDocument/2006/relationships" xmlns:p="http://schemas.openxmlformats.org/presentationml/2006/main">
   <p:cSld>
     <p:spTree>
@@ -2867,6 +2225,253 @@
     <p:extLst>
       <p:ext uri="{BB962C8B-B14F-4D97-AF65-F5344CB8AC3E}">
         <p14:creationId xmlns:p14="http://schemas.microsoft.com/office/powerpoint/2010/main" val="2739719660"/>
+      </p:ext>
+    </p:extLst>
+  </p:cSld>
+  <p:clrMapOvr>
+    <a:masterClrMapping/>
+  </p:clrMapOvr>
+</p:sld>
+</file>
+
+<file path=ppt/slides/slide7.xml><?xml version="1.0" encoding="utf-8"?>
+<p:sld xmlns:a="http://schemas.openxmlformats.org/drawingml/2006/main" xmlns:r="http://schemas.openxmlformats.org/officeDocument/2006/relationships" xmlns:p="http://schemas.openxmlformats.org/presentationml/2006/main">
+  <p:cSld>
+    <p:spTree>
+      <p:nvGrpSpPr>
+        <p:cNvPr id="1" name=""/>
+        <p:cNvGrpSpPr/>
+        <p:nvPr/>
+      </p:nvGrpSpPr>
+      <p:grpSpPr>
+        <a:xfrm>
+          <a:off x="0" y="0"/>
+          <a:ext cx="0" cy="0"/>
+          <a:chOff x="0" y="0"/>
+          <a:chExt cx="0" cy="0"/>
+        </a:xfrm>
+      </p:grpSpPr>
+      <p:sp>
+        <p:nvSpPr>
+          <p:cNvPr id="3" name="TextBox 2">
+            <a:extLst>
+              <a:ext uri="{FF2B5EF4-FFF2-40B4-BE49-F238E27FC236}">
+                <a16:creationId xmlns:a16="http://schemas.microsoft.com/office/drawing/2014/main" id="{5C469FB7-C60C-248E-A62B-8B494AF60626}"/>
+              </a:ext>
+            </a:extLst>
+          </p:cNvPr>
+          <p:cNvSpPr txBox="1"/>
+          <p:nvPr/>
+        </p:nvSpPr>
+        <p:spPr>
+          <a:xfrm>
+            <a:off x="646761" y="286140"/>
+            <a:ext cx="10898477" cy="6299417"/>
+          </a:xfrm>
+          <a:prstGeom prst="rect">
+            <a:avLst/>
+          </a:prstGeom>
+          <a:noFill/>
+        </p:spPr>
+        <p:txBody>
+          <a:bodyPr wrap="square" rtlCol="0">
+            <a:spAutoFit/>
+          </a:bodyPr>
+          <a:lstStyle/>
+          <a:p>
+            <a:pPr algn="ctr"/>
+            <a:r>
+              <a:rPr lang="en-GB" sz="4800" b="1" dirty="0"/>
+              <a:t>Rules of the game</a:t>
+            </a:r>
+          </a:p>
+          <a:p>
+            <a:pPr marL="285750" indent="-285750">
+              <a:lnSpc>
+                <a:spcPct val="150000"/>
+              </a:lnSpc>
+              <a:buFont typeface="Arial" panose="020B0604020202020204" pitchFamily="34" charset="0"/>
+              <a:buChar char="•"/>
+            </a:pPr>
+            <a:r>
+              <a:rPr lang="en-GB" sz="3600" dirty="0"/>
+              <a:t>The objective of the game is to get as many points as possible.</a:t>
+            </a:r>
+          </a:p>
+          <a:p>
+            <a:pPr marL="285750" indent="-285750">
+              <a:lnSpc>
+                <a:spcPct val="150000"/>
+              </a:lnSpc>
+              <a:buFont typeface="Arial" panose="020B0604020202020204" pitchFamily="34" charset="0"/>
+              <a:buChar char="•"/>
+            </a:pPr>
+            <a:r>
+              <a:rPr lang="en-GB" sz="3600" dirty="0"/>
+              <a:t>In GO trials you get points if you answer correct. </a:t>
+            </a:r>
+            <a:r>
+              <a:rPr lang="en-GB" sz="3600" b="1" dirty="0"/>
+              <a:t>The faster you respond the more points you will get</a:t>
+            </a:r>
+            <a:r>
+              <a:rPr lang="en-GB" sz="3600" dirty="0"/>
+              <a:t>.</a:t>
+            </a:r>
+          </a:p>
+          <a:p>
+            <a:pPr marL="285750" indent="-285750">
+              <a:lnSpc>
+                <a:spcPct val="150000"/>
+              </a:lnSpc>
+              <a:buFont typeface="Arial" panose="020B0604020202020204" pitchFamily="34" charset="0"/>
+              <a:buChar char="•"/>
+            </a:pPr>
+            <a:r>
+              <a:rPr lang="en-GB" sz="3600" dirty="0"/>
+              <a:t>In STOP trials if you answer incorrectly, </a:t>
+            </a:r>
+            <a:r>
+              <a:rPr lang="en-GB" sz="3600" b="1" dirty="0"/>
+              <a:t>you will lose all points </a:t>
+            </a:r>
+            <a:r>
+              <a:rPr lang="en-GB" sz="3600" dirty="0"/>
+              <a:t>since the last STOP trial or the start of the game.</a:t>
+            </a:r>
+          </a:p>
+          <a:p>
+            <a:pPr>
+              <a:lnSpc>
+                <a:spcPct val="110000"/>
+              </a:lnSpc>
+            </a:pPr>
+            <a:endParaRPr lang="en-GB" sz="3000" dirty="0"/>
+          </a:p>
+        </p:txBody>
+      </p:sp>
+    </p:spTree>
+    <p:extLst>
+      <p:ext uri="{BB962C8B-B14F-4D97-AF65-F5344CB8AC3E}">
+        <p14:creationId xmlns:p14="http://schemas.microsoft.com/office/powerpoint/2010/main" val="3266365140"/>
+      </p:ext>
+    </p:extLst>
+  </p:cSld>
+  <p:clrMapOvr>
+    <a:masterClrMapping/>
+  </p:clrMapOvr>
+</p:sld>
+</file>
+
+<file path=ppt/slides/slide8.xml><?xml version="1.0" encoding="utf-8"?>
+<p:sld xmlns:a="http://schemas.openxmlformats.org/drawingml/2006/main" xmlns:r="http://schemas.openxmlformats.org/officeDocument/2006/relationships" xmlns:p="http://schemas.openxmlformats.org/presentationml/2006/main">
+  <p:cSld>
+    <p:spTree>
+      <p:nvGrpSpPr>
+        <p:cNvPr id="1" name=""/>
+        <p:cNvGrpSpPr/>
+        <p:nvPr/>
+      </p:nvGrpSpPr>
+      <p:grpSpPr>
+        <a:xfrm>
+          <a:off x="0" y="0"/>
+          <a:ext cx="0" cy="0"/>
+          <a:chOff x="0" y="0"/>
+          <a:chExt cx="0" cy="0"/>
+        </a:xfrm>
+      </p:grpSpPr>
+      <p:sp>
+        <p:nvSpPr>
+          <p:cNvPr id="2" name="TextBox 1">
+            <a:extLst>
+              <a:ext uri="{FF2B5EF4-FFF2-40B4-BE49-F238E27FC236}">
+                <a16:creationId xmlns:a16="http://schemas.microsoft.com/office/drawing/2014/main" id="{AF388601-D0F5-FFE8-CB40-EB018A70D49F}"/>
+              </a:ext>
+            </a:extLst>
+          </p:cNvPr>
+          <p:cNvSpPr txBox="1"/>
+          <p:nvPr/>
+        </p:nvSpPr>
+        <p:spPr>
+          <a:xfrm>
+            <a:off x="646761" y="286140"/>
+            <a:ext cx="10898477" cy="5760808"/>
+          </a:xfrm>
+          <a:prstGeom prst="rect">
+            <a:avLst/>
+          </a:prstGeom>
+          <a:noFill/>
+        </p:spPr>
+        <p:txBody>
+          <a:bodyPr wrap="square" rtlCol="0">
+            <a:spAutoFit/>
+          </a:bodyPr>
+          <a:lstStyle/>
+          <a:p>
+            <a:pPr algn="ctr"/>
+            <a:r>
+              <a:rPr lang="en-GB" sz="4000" b="1" dirty="0"/>
+              <a:t>Instructions</a:t>
+            </a:r>
+          </a:p>
+          <a:p>
+            <a:pPr marL="285750" indent="-285750">
+              <a:lnSpc>
+                <a:spcPct val="110000"/>
+              </a:lnSpc>
+              <a:buFont typeface="Arial" panose="020B0604020202020204" pitchFamily="34" charset="0"/>
+              <a:buChar char="•"/>
+            </a:pPr>
+            <a:r>
+              <a:rPr lang="en-GB" sz="3000" dirty="0"/>
+              <a:t>In this task, you must respond as quickly and accurately as possible to a left or right-pointing arrow. You respond by pressing the left or right keys of your pad. </a:t>
+            </a:r>
+          </a:p>
+          <a:p>
+            <a:pPr marL="285750" indent="-285750">
+              <a:lnSpc>
+                <a:spcPct val="110000"/>
+              </a:lnSpc>
+              <a:buFont typeface="Arial" panose="020B0604020202020204" pitchFamily="34" charset="0"/>
+              <a:buChar char="•"/>
+            </a:pPr>
+            <a:r>
+              <a:rPr lang="en-GB" sz="3000" dirty="0"/>
+              <a:t>You have only a short time to respond, so you must be ready for the task, which requires your full attention.</a:t>
+            </a:r>
+          </a:p>
+          <a:p>
+            <a:pPr marL="285750" indent="-285750">
+              <a:lnSpc>
+                <a:spcPct val="110000"/>
+              </a:lnSpc>
+              <a:buFont typeface="Arial" panose="020B0604020202020204" pitchFamily="34" charset="0"/>
+              <a:buChar char="•"/>
+            </a:pPr>
+            <a:r>
+              <a:rPr lang="en-GB" sz="3000" dirty="0"/>
+              <a:t>However, if you see a RED CIRCLE, you should NOT RESPOND!</a:t>
+            </a:r>
+          </a:p>
+          <a:p>
+            <a:pPr marL="285750" indent="-285750">
+              <a:lnSpc>
+                <a:spcPct val="110000"/>
+              </a:lnSpc>
+              <a:buFont typeface="Arial" panose="020B0604020202020204" pitchFamily="34" charset="0"/>
+              <a:buChar char="•"/>
+            </a:pPr>
+            <a:r>
+              <a:rPr lang="en-GB" sz="3000" dirty="0"/>
+              <a:t>It seems easy, but it is actually very difficult. Additionally, the computer will adjust the task speed based on your performance during the task; this means that sometimes, it will be difficult for you not to respond. </a:t>
+            </a:r>
+          </a:p>
+        </p:txBody>
+      </p:sp>
+    </p:spTree>
+    <p:extLst>
+      <p:ext uri="{BB962C8B-B14F-4D97-AF65-F5344CB8AC3E}">
+        <p14:creationId xmlns:p14="http://schemas.microsoft.com/office/powerpoint/2010/main" val="3297780617"/>
       </p:ext>
     </p:extLst>
   </p:cSld>

</xml_diff>